<commit_message>
Post Event changes - SQL Sat Albany
</commit_message>
<xml_diff>
--- a/SQL Sat 1083 - Albany/Intro to Powershell/Intro to Powershell.pptx
+++ b/SQL Sat 1083 - Albany/Intro to Powershell/Intro to Powershell.pptx
@@ -37,18 +37,11 @@
   <p:notesSz cx="6858000" cy="9144000"/>
   <p:embeddedFontLst>
     <p:embeddedFont>
-      <p:font typeface="Calibri" panose="020F0502020204030204" pitchFamily="34" charset="0"/>
+      <p:font typeface="Roboto" panose="02000000000000000000" pitchFamily="2" charset="0"/>
       <p:regular r:id="rId27"/>
       <p:bold r:id="rId28"/>
       <p:italic r:id="rId29"/>
       <p:boldItalic r:id="rId30"/>
-    </p:embeddedFont>
-    <p:embeddedFont>
-      <p:font typeface="Roboto" panose="02000000000000000000" pitchFamily="2" charset="0"/>
-      <p:regular r:id="rId31"/>
-      <p:bold r:id="rId32"/>
-      <p:italic r:id="rId33"/>
-      <p:boldItalic r:id="rId34"/>
     </p:embeddedFont>
   </p:embeddedFontLst>
   <p:defaultTextStyle>
@@ -296,6 +289,43 @@
   <p:cmAuthor id="0" name="Peter Shore" initials="" lastIdx="4" clrIdx="0"/>
   <p:cmAuthor id="1" name="Tony Wilhelm" initials="" lastIdx="2" clrIdx="1"/>
 </p:cmAuthorLst>
+</file>
+
+<file path=ppt/revisionInfo.xml><?xml version="1.0" encoding="utf-8"?>
+<p1510:revInfo xmlns:a="http://schemas.openxmlformats.org/drawingml/2006/main" xmlns:r="http://schemas.openxmlformats.org/officeDocument/2006/relationships" xmlns:p1510="http://schemas.microsoft.com/office/powerpoint/2015/10/main">
+  <p1510:revLst>
+    <p1510:client id="{18F67ABC-87E2-438C-86F7-6E56C4A46390}" v="1" dt="2024-08-03T15:04:53.068"/>
+  </p1510:revLst>
+</p1510:revInfo>
+</file>
+
+<file path=ppt/changesInfos/changesInfo1.xml><?xml version="1.0" encoding="utf-8"?>
+<pc:chgInfo xmlns:a="http://schemas.openxmlformats.org/drawingml/2006/main" xmlns:r="http://schemas.openxmlformats.org/officeDocument/2006/relationships" xmlns:ac="http://schemas.microsoft.com/office/drawing/2013/main/command" xmlns:pc="http://schemas.microsoft.com/office/powerpoint/2013/main/command">
+  <pc:docChgLst>
+    <pc:chgData name="Anthony (Tony) Wilhelm" userId="111808ec-cec1-4bb5-b99a-563afe69ab96" providerId="ADAL" clId="{18F67ABC-87E2-438C-86F7-6E56C4A46390}"/>
+    <pc:docChg chg="undo custSel modSld">
+      <pc:chgData name="Anthony (Tony) Wilhelm" userId="111808ec-cec1-4bb5-b99a-563afe69ab96" providerId="ADAL" clId="{18F67ABC-87E2-438C-86F7-6E56C4A46390}" dt="2024-08-02T14:04:01.180" v="20" actId="20577"/>
+      <pc:docMkLst>
+        <pc:docMk/>
+      </pc:docMkLst>
+      <pc:sldChg chg="modSp mod">
+        <pc:chgData name="Anthony (Tony) Wilhelm" userId="111808ec-cec1-4bb5-b99a-563afe69ab96" providerId="ADAL" clId="{18F67ABC-87E2-438C-86F7-6E56C4A46390}" dt="2024-08-02T14:04:01.180" v="20" actId="20577"/>
+        <pc:sldMkLst>
+          <pc:docMk/>
+          <pc:sldMk cId="0" sldId="272"/>
+        </pc:sldMkLst>
+        <pc:spChg chg="mod">
+          <ac:chgData name="Anthony (Tony) Wilhelm" userId="111808ec-cec1-4bb5-b99a-563afe69ab96" providerId="ADAL" clId="{18F67ABC-87E2-438C-86F7-6E56C4A46390}" dt="2024-08-02T14:04:01.180" v="20" actId="20577"/>
+          <ac:spMkLst>
+            <pc:docMk/>
+            <pc:sldMk cId="0" sldId="272"/>
+            <ac:spMk id="262" creationId="{00000000-0000-0000-0000-000000000000}"/>
+          </ac:spMkLst>
+        </pc:spChg>
+      </pc:sldChg>
+    </pc:docChg>
+  </pc:docChgLst>
+</pc:chgInfo>
 </file>
 
 <file path=ppt/comments/comment1.xml><?xml version="1.0" encoding="utf-8"?>
@@ -15368,24 +15398,24 @@
               <a:buNone/>
             </a:pPr>
             <a:r>
-              <a:rPr lang="en-US" sz="5200"/>
+              <a:rPr lang="en-US" sz="5200" dirty="0"/>
               <a:t>Intro to PowerShell </a:t>
             </a:r>
             <a:br>
-              <a:rPr lang="en-US" sz="5200"/>
+              <a:rPr lang="en-US" sz="5200" dirty="0"/>
             </a:br>
             <a:r>
-              <a:rPr lang="en-US" sz="5200"/>
+              <a:rPr lang="en-US" sz="5200" dirty="0"/>
               <a:t>with dbatools </a:t>
             </a:r>
             <a:br>
-              <a:rPr lang="en-US" sz="5200"/>
+              <a:rPr lang="en-US" sz="5200" dirty="0"/>
             </a:br>
             <a:r>
-              <a:rPr lang="en-US" sz="5200"/>
+              <a:rPr lang="en-US" sz="5200" dirty="0"/>
               <a:t>for the DBA</a:t>
             </a:r>
-            <a:endParaRPr sz="6400"/>
+            <a:endParaRPr sz="6400" dirty="0"/>
           </a:p>
         </p:txBody>
       </p:sp>
@@ -16509,7 +16539,15 @@
             </a:pPr>
             <a:r>
               <a:rPr lang="en-US" sz="2600" dirty="0"/>
-              <a:t>Over 269 thousand total packages</a:t>
+              <a:t>Over </a:t>
+            </a:r>
+            <a:r>
+              <a:rPr lang="en-US" sz="2600" strike="sngStrike" dirty="0"/>
+              <a:t>269</a:t>
+            </a:r>
+            <a:r>
+              <a:rPr lang="en-US" sz="2600" dirty="0"/>
+              <a:t> 353 thousand total packages</a:t>
             </a:r>
             <a:endParaRPr sz="2600" dirty="0"/>
           </a:p>
@@ -16532,7 +16570,7 @@
             </a:pPr>
             <a:r>
               <a:rPr lang="en-US" sz="2600" dirty="0"/>
-              <a:t>Over </a:t>
+              <a:t>Almost </a:t>
             </a:r>
             <a:r>
               <a:rPr lang="en-US" sz="2600" strike="sngStrike" dirty="0"/>
@@ -16540,7 +16578,7 @@
             </a:r>
             <a:r>
               <a:rPr lang="en-US" sz="2600" dirty="0"/>
-              <a:t> 12 thousand unique packages</a:t>
+              <a:t> 13 thousand unique packages</a:t>
             </a:r>
             <a:endParaRPr sz="2600" dirty="0"/>
           </a:p>
@@ -16579,7 +16617,7 @@
             </a:r>
             <a:r>
               <a:rPr lang="en-US" sz="2600" dirty="0"/>
-              <a:t> 10 billion packages downloaded</a:t>
+              <a:t> 14 billion packages downloaded</a:t>
             </a:r>
             <a:endParaRPr sz="2600" dirty="0"/>
           </a:p>
@@ -18455,7 +18493,7 @@
               <a:buNone/>
             </a:pPr>
             <a:r>
-              <a:rPr lang="en-US" sz="2600" b="0" i="0" u="none" strike="noStrike" cap="none">
+              <a:rPr lang="en-US" sz="2600" b="0" i="0" u="none" strike="noStrike" cap="none" dirty="0">
                 <a:solidFill>
                   <a:schemeClr val="dk1"/>
                 </a:solidFill>
@@ -18467,7 +18505,7 @@
               <a:t>A pipeline is a series of commands connected by the “|” symbol.</a:t>
             </a:r>
             <a:br>
-              <a:rPr lang="en-US" sz="2600" b="0" i="0" u="none" strike="noStrike" cap="none">
+              <a:rPr lang="en-US" sz="2600" b="0" i="0" u="none" strike="noStrike" cap="none" dirty="0">
                 <a:solidFill>
                   <a:schemeClr val="dk1"/>
                 </a:solidFill>
@@ -18477,7 +18515,7 @@
                 <a:sym typeface="Calibri"/>
               </a:rPr>
             </a:br>
-            <a:endParaRPr sz="2600" b="0" i="0" u="none" strike="noStrike" cap="none">
+            <a:endParaRPr sz="2600" b="0" i="0" u="none" strike="noStrike" cap="none" dirty="0">
               <a:solidFill>
                 <a:schemeClr val="dk1"/>
               </a:solidFill>
@@ -18497,7 +18535,7 @@
               </a:spcAft>
               <a:buNone/>
             </a:pPr>
-            <a:endParaRPr sz="2600">
+            <a:endParaRPr sz="2600" dirty="0">
               <a:solidFill>
                 <a:schemeClr val="dk1"/>
               </a:solidFill>
@@ -18518,7 +18556,7 @@
               <a:buNone/>
             </a:pPr>
             <a:r>
-              <a:rPr lang="en-US" sz="2600" b="0" i="0" u="none" strike="noStrike" cap="none">
+              <a:rPr lang="en-US" sz="2600" b="0" i="0" u="none" strike="noStrike" cap="none" dirty="0">
                 <a:solidFill>
                   <a:schemeClr val="dk1"/>
                 </a:solidFill>
@@ -18530,7 +18568,7 @@
               <a:t>With the pipeline, the output of the first command is passed on to the second command.</a:t>
             </a:r>
             <a:br>
-              <a:rPr lang="en-US" sz="2600" b="0" i="0" u="none" strike="noStrike" cap="none">
+              <a:rPr lang="en-US" sz="2600" b="0" i="0" u="none" strike="noStrike" cap="none" dirty="0">
                 <a:solidFill>
                   <a:schemeClr val="dk1"/>
                 </a:solidFill>
@@ -18540,7 +18578,7 @@
                 <a:sym typeface="Calibri"/>
               </a:rPr>
             </a:br>
-            <a:endParaRPr sz="2600" b="0" i="0" u="none" strike="noStrike" cap="none">
+            <a:endParaRPr sz="2600" b="0" i="0" u="none" strike="noStrike" cap="none" dirty="0">
               <a:solidFill>
                 <a:schemeClr val="dk1"/>
               </a:solidFill>
@@ -18560,7 +18598,7 @@
               </a:spcAft>
               <a:buNone/>
             </a:pPr>
-            <a:endParaRPr sz="2600">
+            <a:endParaRPr sz="2600" dirty="0">
               <a:solidFill>
                 <a:schemeClr val="dk1"/>
               </a:solidFill>
@@ -18581,7 +18619,7 @@
               <a:buNone/>
             </a:pPr>
             <a:r>
-              <a:rPr lang="en-US" sz="2600" b="0" i="0" u="none" strike="noStrike" cap="none">
+              <a:rPr lang="en-US" sz="2600" b="0" i="0" u="none" strike="noStrike" cap="none" dirty="0">
                 <a:solidFill>
                   <a:schemeClr val="dk1"/>
                 </a:solidFill>
@@ -18592,7 +18630,7 @@
               </a:rPr>
               <a:t>Most but not all PowerShell and dbatools commands accept pipeline input</a:t>
             </a:r>
-            <a:endParaRPr sz="2600"/>
+            <a:endParaRPr sz="2600" dirty="0"/>
           </a:p>
         </p:txBody>
       </p:sp>
@@ -22650,16 +22688,25 @@
               <a:buChar char="•"/>
             </a:pPr>
             <a:r>
-              <a:rPr lang="en-US" sz="2000" u="sng">
+              <a:rPr lang="en-US" sz="2000" u="sng" dirty="0" err="1">
                 <a:latin typeface="Arial"/>
                 <a:ea typeface="Arial"/>
                 <a:cs typeface="Arial"/>
                 <a:sym typeface="Arial"/>
               </a:rPr>
-              <a:t>Powershell Gallery</a:t>
+              <a:t>Powershell</a:t>
+            </a:r>
+            <a:r>
+              <a:rPr lang="en-US" sz="2000" u="sng" dirty="0">
+                <a:latin typeface="Arial"/>
+                <a:ea typeface="Arial"/>
+                <a:cs typeface="Arial"/>
+                <a:sym typeface="Arial"/>
+              </a:rPr>
+              <a:t> Gallery</a:t>
             </a:r>
             <a:br>
-              <a:rPr lang="en-US" sz="2000" u="sng">
+              <a:rPr lang="en-US" sz="2000" u="sng" dirty="0">
                 <a:latin typeface="Arial"/>
                 <a:ea typeface="Arial"/>
                 <a:cs typeface="Arial"/>
@@ -22667,7 +22714,7 @@
               </a:rPr>
             </a:br>
             <a:r>
-              <a:rPr lang="en-US" sz="2000" u="sng">
+              <a:rPr lang="en-US" sz="2000" u="sng" dirty="0">
                 <a:solidFill>
                   <a:schemeClr val="hlink"/>
                 </a:solidFill>
@@ -22680,14 +22727,14 @@
               <a:t>https://www.powershellgallery.com/</a:t>
             </a:r>
             <a:br>
-              <a:rPr lang="en-US" sz="2000" u="sng">
+              <a:rPr lang="en-US" sz="2000" u="sng" dirty="0">
                 <a:latin typeface="Arial"/>
                 <a:ea typeface="Arial"/>
                 <a:cs typeface="Arial"/>
                 <a:sym typeface="Arial"/>
               </a:rPr>
             </a:br>
-            <a:endParaRPr sz="2000" u="sng">
+            <a:endParaRPr sz="2000" u="sng" dirty="0">
               <a:latin typeface="Arial"/>
               <a:ea typeface="Arial"/>
               <a:cs typeface="Arial"/>
@@ -22712,16 +22759,34 @@
               <a:buChar char="•"/>
             </a:pPr>
             <a:r>
-              <a:rPr lang="en-US" sz="2000" b="0" i="0" u="sng" strike="noStrike">
+              <a:rPr lang="en-US" sz="2000" b="0" i="0" u="sng" strike="noStrike" dirty="0">
                 <a:latin typeface="Arial"/>
                 <a:ea typeface="Arial"/>
                 <a:cs typeface="Arial"/>
                 <a:sym typeface="Arial"/>
               </a:rPr>
-              <a:t>Microsoft Powershell Documentation</a:t>
+              <a:t>Microsoft </a:t>
+            </a:r>
+            <a:r>
+              <a:rPr lang="en-US" sz="2000" b="0" i="0" u="sng" strike="noStrike" dirty="0" err="1">
+                <a:latin typeface="Arial"/>
+                <a:ea typeface="Arial"/>
+                <a:cs typeface="Arial"/>
+                <a:sym typeface="Arial"/>
+              </a:rPr>
+              <a:t>Powershell</a:t>
+            </a:r>
+            <a:r>
+              <a:rPr lang="en-US" sz="2000" b="0" i="0" u="sng" strike="noStrike" dirty="0">
+                <a:latin typeface="Arial"/>
+                <a:ea typeface="Arial"/>
+                <a:cs typeface="Arial"/>
+                <a:sym typeface="Arial"/>
+              </a:rPr>
+              <a:t> Documentation</a:t>
             </a:r>
             <a:br>
-              <a:rPr lang="en-US" sz="2000" b="0" i="0" u="sng" strike="noStrike">
+              <a:rPr lang="en-US" sz="2000" b="0" i="0" u="sng" strike="noStrike" dirty="0">
                 <a:latin typeface="Arial"/>
                 <a:ea typeface="Arial"/>
                 <a:cs typeface="Arial"/>
@@ -22729,7 +22794,7 @@
               </a:rPr>
             </a:br>
             <a:r>
-              <a:rPr lang="en-US" sz="2000" b="0" i="0" u="sng" strike="noStrike">
+              <a:rPr lang="en-US" sz="2000" b="0" i="0" u="sng" strike="noStrike" dirty="0">
                 <a:solidFill>
                   <a:schemeClr val="hlink"/>
                 </a:solidFill>
@@ -22742,14 +22807,14 @@
               <a:t>https://learn.microsoft.com/en-us/powershell/scripting/learn/ps101/00-introduction</a:t>
             </a:r>
             <a:br>
-              <a:rPr lang="en-US" sz="2000" b="0" i="0" u="sng" strike="noStrike">
+              <a:rPr lang="en-US" sz="2000" b="0" i="0" u="sng" strike="noStrike" dirty="0">
                 <a:latin typeface="Arial"/>
                 <a:ea typeface="Arial"/>
                 <a:cs typeface="Arial"/>
                 <a:sym typeface="Arial"/>
               </a:rPr>
             </a:br>
-            <a:endParaRPr sz="2000" b="0" i="0" u="sng" strike="noStrike">
+            <a:endParaRPr sz="2000" b="0" i="0" u="sng" strike="noStrike" dirty="0">
               <a:latin typeface="Arial"/>
               <a:ea typeface="Arial"/>
               <a:cs typeface="Arial"/>
@@ -22768,7 +22833,7 @@
               <a:buChar char="•"/>
             </a:pPr>
             <a:r>
-              <a:rPr lang="en-US" sz="2000">
+              <a:rPr lang="en-US" sz="2000" dirty="0">
                 <a:latin typeface="Arial"/>
                 <a:ea typeface="Arial"/>
                 <a:cs typeface="Arial"/>
@@ -22777,7 +22842,7 @@
               <a:t>dbatools </a:t>
             </a:r>
             <a:br>
-              <a:rPr lang="en-US" sz="2000">
+              <a:rPr lang="en-US" sz="2000" dirty="0">
                 <a:latin typeface="Arial"/>
                 <a:ea typeface="Arial"/>
                 <a:cs typeface="Arial"/>
@@ -22785,7 +22850,7 @@
               </a:rPr>
             </a:br>
             <a:r>
-              <a:rPr lang="en-US" sz="2000" u="sng">
+              <a:rPr lang="en-US" sz="2000" u="sng" dirty="0">
                 <a:solidFill>
                   <a:schemeClr val="hlink"/>
                 </a:solidFill>
@@ -22797,7 +22862,7 @@
               </a:rPr>
               <a:t>https://dbatools.io/</a:t>
             </a:r>
-            <a:endParaRPr sz="2000">
+            <a:endParaRPr sz="2000" dirty="0">
               <a:latin typeface="Arial"/>
               <a:ea typeface="Arial"/>
               <a:cs typeface="Arial"/>
@@ -24685,14 +24750,14 @@
               <a:buNone/>
             </a:pPr>
             <a:r>
-              <a:rPr lang="en-US" sz="4000">
+              <a:rPr lang="en-US" sz="4000" dirty="0">
                 <a:solidFill>
                   <a:srgbClr val="FFFFFF"/>
                 </a:solidFill>
               </a:rPr>
               <a:t>History of dbatools</a:t>
             </a:r>
-            <a:endParaRPr/>
+            <a:endParaRPr dirty="0"/>
           </a:p>
         </p:txBody>
       </p:sp>

</xml_diff>